<commit_message>
Deploying to gh-pages from @ w4bo/SEBD-2024-colossal@8106968d402a339c8c0a58332d5c0a1861e55988 🚀
</commit_message>
<xml_diff>
--- a/poster.pptx
+++ b/poster.pptx
@@ -243,7 +243,7 @@
           <a:p>
             <a:fld id="{17A0AD2C-56CF-4BE2-B79F-EE3A43C1548D}" type="datetimeFigureOut">
               <a:rPr lang="en-US" smtClean="0"/>
-              <a:t>2024-06-18</a:t>
+              <a:t>2024-06-19</a:t>
             </a:fld>
             <a:endParaRPr lang="en-US"/>
           </a:p>
@@ -413,7 +413,7 @@
           <a:p>
             <a:fld id="{17A0AD2C-56CF-4BE2-B79F-EE3A43C1548D}" type="datetimeFigureOut">
               <a:rPr lang="en-US" smtClean="0"/>
-              <a:t>2024-06-18</a:t>
+              <a:t>2024-06-19</a:t>
             </a:fld>
             <a:endParaRPr lang="en-US"/>
           </a:p>
@@ -593,7 +593,7 @@
           <a:p>
             <a:fld id="{17A0AD2C-56CF-4BE2-B79F-EE3A43C1548D}" type="datetimeFigureOut">
               <a:rPr lang="en-US" smtClean="0"/>
-              <a:t>2024-06-18</a:t>
+              <a:t>2024-06-19</a:t>
             </a:fld>
             <a:endParaRPr lang="en-US"/>
           </a:p>
@@ -763,7 +763,7 @@
           <a:p>
             <a:fld id="{17A0AD2C-56CF-4BE2-B79F-EE3A43C1548D}" type="datetimeFigureOut">
               <a:rPr lang="en-US" smtClean="0"/>
-              <a:t>2024-06-18</a:t>
+              <a:t>2024-06-19</a:t>
             </a:fld>
             <a:endParaRPr lang="en-US"/>
           </a:p>
@@ -1007,7 +1007,7 @@
           <a:p>
             <a:fld id="{17A0AD2C-56CF-4BE2-B79F-EE3A43C1548D}" type="datetimeFigureOut">
               <a:rPr lang="en-US" smtClean="0"/>
-              <a:t>2024-06-18</a:t>
+              <a:t>2024-06-19</a:t>
             </a:fld>
             <a:endParaRPr lang="en-US"/>
           </a:p>
@@ -1239,7 +1239,7 @@
           <a:p>
             <a:fld id="{17A0AD2C-56CF-4BE2-B79F-EE3A43C1548D}" type="datetimeFigureOut">
               <a:rPr lang="en-US" smtClean="0"/>
-              <a:t>2024-06-18</a:t>
+              <a:t>2024-06-19</a:t>
             </a:fld>
             <a:endParaRPr lang="en-US"/>
           </a:p>
@@ -1606,7 +1606,7 @@
           <a:p>
             <a:fld id="{17A0AD2C-56CF-4BE2-B79F-EE3A43C1548D}" type="datetimeFigureOut">
               <a:rPr lang="en-US" smtClean="0"/>
-              <a:t>2024-06-18</a:t>
+              <a:t>2024-06-19</a:t>
             </a:fld>
             <a:endParaRPr lang="en-US"/>
           </a:p>
@@ -1724,7 +1724,7 @@
           <a:p>
             <a:fld id="{17A0AD2C-56CF-4BE2-B79F-EE3A43C1548D}" type="datetimeFigureOut">
               <a:rPr lang="en-US" smtClean="0"/>
-              <a:t>2024-06-18</a:t>
+              <a:t>2024-06-19</a:t>
             </a:fld>
             <a:endParaRPr lang="en-US"/>
           </a:p>
@@ -1819,7 +1819,7 @@
           <a:p>
             <a:fld id="{17A0AD2C-56CF-4BE2-B79F-EE3A43C1548D}" type="datetimeFigureOut">
               <a:rPr lang="en-US" smtClean="0"/>
-              <a:t>2024-06-18</a:t>
+              <a:t>2024-06-19</a:t>
             </a:fld>
             <a:endParaRPr lang="en-US"/>
           </a:p>
@@ -2096,7 +2096,7 @@
           <a:p>
             <a:fld id="{17A0AD2C-56CF-4BE2-B79F-EE3A43C1548D}" type="datetimeFigureOut">
               <a:rPr lang="en-US" smtClean="0"/>
-              <a:t>2024-06-18</a:t>
+              <a:t>2024-06-19</a:t>
             </a:fld>
             <a:endParaRPr lang="en-US"/>
           </a:p>
@@ -2353,7 +2353,7 @@
           <a:p>
             <a:fld id="{17A0AD2C-56CF-4BE2-B79F-EE3A43C1548D}" type="datetimeFigureOut">
               <a:rPr lang="en-US" smtClean="0"/>
-              <a:t>2024-06-18</a:t>
+              <a:t>2024-06-19</a:t>
             </a:fld>
             <a:endParaRPr lang="en-US"/>
           </a:p>
@@ -2566,7 +2566,7 @@
           <a:p>
             <a:fld id="{17A0AD2C-56CF-4BE2-B79F-EE3A43C1548D}" type="datetimeFigureOut">
               <a:rPr lang="en-US" smtClean="0"/>
-              <a:t>2024-06-18</a:t>
+              <a:t>2024-06-19</a:t>
             </a:fld>
             <a:endParaRPr lang="en-US"/>
           </a:p>
@@ -3023,7 +3023,7 @@
           <a:p>
             <a:pPr algn="just"/>
             <a:r>
-              <a:rPr lang="en-US" sz="5400" b="1" dirty="0">
+              <a:rPr lang="en-US" sz="5400" b="1">
                 <a:solidFill>
                   <a:schemeClr val="tx1"/>
                 </a:solidFill>
@@ -3036,7 +3036,7 @@
           <a:p>
             <a:pPr algn="just"/>
             <a:r>
-              <a:rPr lang="en-US" sz="4400" dirty="0">
+              <a:rPr lang="en-US" sz="4400">
                 <a:solidFill>
                   <a:schemeClr val="tx1"/>
                 </a:solidFill>
@@ -3049,7 +3049,7 @@
           <a:p>
             <a:pPr algn="just"/>
             <a:r>
-              <a:rPr lang="en-US" sz="4400" dirty="0">
+              <a:rPr lang="en-US" sz="4400">
                 <a:solidFill>
                   <a:schemeClr val="tx1"/>
                 </a:solidFill>
@@ -3062,7 +3062,7 @@
           <a:p>
             <a:pPr algn="just"/>
             <a:r>
-              <a:rPr lang="en-US" sz="4400" dirty="0">
+              <a:rPr lang="en-US" sz="4400">
                 <a:latin typeface="Helvetica" panose="020B0604020202020204" pitchFamily="34" charset="0"/>
                 <a:cs typeface="Helvetica" panose="020B0604020202020204" pitchFamily="34" charset="0"/>
                 <a:hlinkClick r:id="rId2"/>
@@ -3070,13 +3070,13 @@
               <a:t>m.francia@unibo.it</a:t>
             </a:r>
             <a:r>
-              <a:rPr lang="en-US" sz="4400" dirty="0">
+              <a:rPr lang="en-US" sz="4400">
                 <a:latin typeface="Helvetica" panose="020B0604020202020204" pitchFamily="34" charset="0"/>
                 <a:cs typeface="Helvetica" panose="020B0604020202020204" pitchFamily="34" charset="0"/>
               </a:rPr>
               <a:t> </a:t>
             </a:r>
-            <a:endParaRPr lang="en-US" sz="4400" dirty="0">
+            <a:endParaRPr lang="en-US" sz="4400">
               <a:solidFill>
                 <a:schemeClr val="tx1"/>
               </a:solidFill>
@@ -3151,108 +3151,73 @@
           <a:lstStyle/>
           <a:p>
             <a:r>
-              <a:rPr lang="en-US" sz="8000" b="1" dirty="0">
+              <a:rPr lang="en-US" sz="8000" b="1">
                 <a:latin typeface="Helvetica" panose="020B0604020202020204" pitchFamily="34" charset="0"/>
                 <a:cs typeface="Helvetica" panose="020B0604020202020204" pitchFamily="34" charset="0"/>
               </a:rPr>
               <a:t>Colossal Trajectory Mining</a:t>
             </a:r>
             <a:br>
-              <a:rPr lang="en-US" sz="8000" b="1" dirty="0">
+              <a:rPr lang="en-US" sz="8000" b="1">
                 <a:latin typeface="Helvetica" panose="020B0604020202020204" pitchFamily="34" charset="0"/>
                 <a:cs typeface="Helvetica" panose="020B0604020202020204" pitchFamily="34" charset="0"/>
               </a:rPr>
             </a:br>
             <a:r>
-              <a:rPr lang="en-US" sz="8000" b="1" dirty="0">
+              <a:rPr lang="en-US" sz="8000" b="1">
                 <a:latin typeface="Helvetica" panose="020B0604020202020204" pitchFamily="34" charset="0"/>
                 <a:cs typeface="Helvetica" panose="020B0604020202020204" pitchFamily="34" charset="0"/>
               </a:rPr>
               <a:t>Semantic Co-movement Pattern Mining</a:t>
             </a:r>
             <a:br>
-              <a:rPr lang="en-US" sz="8000" b="1" dirty="0">
+              <a:rPr lang="en-US" sz="8000" b="1">
                 <a:latin typeface="Helvetica" panose="020B0604020202020204" pitchFamily="34" charset="0"/>
                 <a:cs typeface="Helvetica" panose="020B0604020202020204" pitchFamily="34" charset="0"/>
               </a:rPr>
             </a:br>
             <a:r>
-              <a:rPr lang="en-US" sz="6000" dirty="0">
+              <a:rPr lang="en-US" sz="6000">
                 <a:latin typeface="Helvetica" panose="020B0604020202020204" pitchFamily="34" charset="0"/>
                 <a:cs typeface="Helvetica" panose="020B0604020202020204" pitchFamily="34" charset="0"/>
               </a:rPr>
-              <a:t>Chiara </a:t>
-            </a:r>
-            <a:r>
-              <a:rPr lang="en-US" sz="6000" dirty="0" err="1">
-                <a:latin typeface="Helvetica" panose="020B0604020202020204" pitchFamily="34" charset="0"/>
-                <a:cs typeface="Helvetica" panose="020B0604020202020204" pitchFamily="34" charset="0"/>
-              </a:rPr>
-              <a:t>Forresi</a:t>
-            </a:r>
-            <a:r>
-              <a:rPr lang="en-US" sz="6000" dirty="0">
-                <a:latin typeface="Helvetica" panose="020B0604020202020204" pitchFamily="34" charset="0"/>
-                <a:cs typeface="Helvetica" panose="020B0604020202020204" pitchFamily="34" charset="0"/>
-              </a:rPr>
-              <a:t>, </a:t>
-            </a:r>
-            <a:r>
-              <a:rPr lang="en-US" sz="6000" u="sng" dirty="0">
+              <a:t>Chiara Forresi, </a:t>
+            </a:r>
+            <a:r>
+              <a:rPr lang="en-US" sz="6000" u="sng">
                 <a:latin typeface="Helvetica" panose="020B0604020202020204" pitchFamily="34" charset="0"/>
                 <a:cs typeface="Helvetica" panose="020B0604020202020204" pitchFamily="34" charset="0"/>
               </a:rPr>
               <a:t>Matteo Francia</a:t>
             </a:r>
             <a:r>
-              <a:rPr lang="en-US" sz="6000" dirty="0">
+              <a:rPr lang="en-US" sz="6000">
                 <a:latin typeface="Helvetica" panose="020B0604020202020204" pitchFamily="34" charset="0"/>
                 <a:cs typeface="Helvetica" panose="020B0604020202020204" pitchFamily="34" charset="0"/>
               </a:rPr>
               <a:t>*, Enrico Gallinucci,</a:t>
             </a:r>
             <a:br>
-              <a:rPr lang="en-US" sz="6000" dirty="0">
+              <a:rPr lang="en-US" sz="6000">
                 <a:latin typeface="Helvetica" panose="020B0604020202020204" pitchFamily="34" charset="0"/>
                 <a:cs typeface="Helvetica" panose="020B0604020202020204" pitchFamily="34" charset="0"/>
               </a:rPr>
             </a:br>
             <a:r>
-              <a:rPr lang="en-US" sz="6000" dirty="0">
+              <a:rPr lang="en-US" sz="6000">
                 <a:latin typeface="Helvetica" panose="020B0604020202020204" pitchFamily="34" charset="0"/>
                 <a:cs typeface="Helvetica" panose="020B0604020202020204" pitchFamily="34" charset="0"/>
               </a:rPr>
-              <a:t>Matteo Golfarelli, </a:t>
-            </a:r>
-            <a:r>
-              <a:rPr lang="en-US" sz="6000" dirty="0" err="1">
-                <a:latin typeface="Helvetica" panose="020B0604020202020204" pitchFamily="34" charset="0"/>
-                <a:cs typeface="Helvetica" panose="020B0604020202020204" pitchFamily="34" charset="0"/>
-              </a:rPr>
-              <a:t>Manuele</a:t>
-            </a:r>
-            <a:r>
-              <a:rPr lang="en-US" sz="6000" dirty="0">
-                <a:latin typeface="Helvetica" panose="020B0604020202020204" pitchFamily="34" charset="0"/>
-                <a:cs typeface="Helvetica" panose="020B0604020202020204" pitchFamily="34" charset="0"/>
-              </a:rPr>
-              <a:t> </a:t>
-            </a:r>
-            <a:r>
-              <a:rPr lang="en-US" sz="6000" dirty="0" err="1">
-                <a:latin typeface="Helvetica" panose="020B0604020202020204" pitchFamily="34" charset="0"/>
-                <a:cs typeface="Helvetica" panose="020B0604020202020204" pitchFamily="34" charset="0"/>
-              </a:rPr>
-              <a:t>Pasini</a:t>
+              <a:t>Matteo Golfarelli, Manuele Pasini</a:t>
             </a:r>
             <a:br>
-              <a:rPr lang="en-US" sz="8000" dirty="0">
+              <a:rPr lang="en-US" sz="8000">
                 <a:latin typeface="Helvetica" panose="020B0604020202020204" pitchFamily="34" charset="0"/>
                 <a:cs typeface="Helvetica" panose="020B0604020202020204" pitchFamily="34" charset="0"/>
               </a:rPr>
             </a:br>
             <a:r>
-              <a:rPr lang="en-US" sz="5000" dirty="0">
+              <a:rPr lang="en-US" sz="5000">
                 <a:latin typeface="Helvetica" panose="020B0604020202020204" pitchFamily="34" charset="0"/>
                 <a:cs typeface="Helvetica" panose="020B0604020202020204" pitchFamily="34" charset="0"/>
               </a:rPr>
@@ -3297,8 +3262,8 @@
           </a:prstGeom>
         </p:spPr>
       </p:pic>
-      <mc:AlternateContent xmlns:mc="http://schemas.openxmlformats.org/markup-compatibility/2006" xmlns:a14="http://schemas.microsoft.com/office/drawing/2010/main">
-        <mc:Choice Requires="a14">
+      <mc:AlternateContent xmlns:mc="http://schemas.openxmlformats.org/markup-compatibility/2006">
+        <mc:Choice xmlns:a14="http://schemas.microsoft.com/office/drawing/2010/main" Requires="a14">
           <p:sp>
             <p:nvSpPr>
               <p:cNvPr id="9" name="Rectangle 8">
@@ -3478,14 +3443,36 @@
                     <a:latin typeface="Helvetica" panose="020B0604020202020204" pitchFamily="34" charset="0"/>
                     <a:cs typeface="Helvetica" panose="020B0604020202020204" pitchFamily="34" charset="0"/>
                   </a:rPr>
-                  <a:t>: finding groups of 100 people given a NIL with 16K residents could require to enumerate </a:t>
+                  <a:t>: finding groups of 100 </a:t>
+                </a:r>
+                <a:r>
+                  <a:rPr lang="en-US" sz="5000" b="0">
+                    <a:solidFill>
+                      <a:schemeClr val="tx1"/>
+                    </a:solidFill>
+                    <a:effectLst/>
+                    <a:latin typeface="Helvetica" panose="020B0604020202020204" pitchFamily="34" charset="0"/>
+                    <a:cs typeface="Helvetica" panose="020B0604020202020204" pitchFamily="34" charset="0"/>
+                  </a:rPr>
+                  <a:t>people in </a:t>
+                </a:r>
+                <a:r>
+                  <a:rPr lang="en-US" sz="5000" b="0" dirty="0">
+                    <a:solidFill>
+                      <a:schemeClr val="tx1"/>
+                    </a:solidFill>
+                    <a:effectLst/>
+                    <a:latin typeface="Helvetica" panose="020B0604020202020204" pitchFamily="34" charset="0"/>
+                    <a:cs typeface="Helvetica" panose="020B0604020202020204" pitchFamily="34" charset="0"/>
+                  </a:rPr>
+                  <a:t>a NIL with 16K residents could require to enumerate </a:t>
                 </a:r>
                 <a14:m>
                   <m:oMath xmlns:m="http://schemas.openxmlformats.org/officeDocument/2006/math">
                     <m:d>
                       <m:dPr>
                         <m:ctrlPr>
-                          <a:rPr lang="pt-BR" sz="5000" i="1">
+                          <a:rPr lang="en-US" sz="5000" i="1" smtClean="0">
                             <a:solidFill>
                               <a:schemeClr val="tx1"/>
                             </a:solidFill>
@@ -3499,7 +3486,7 @@
                           <m:fPr>
                             <m:type m:val="noBar"/>
                             <m:ctrlPr>
-                              <a:rPr lang="pt-BR" sz="5000" i="1">
+                              <a:rPr lang="en-US" sz="5000" i="1" smtClean="0">
                                 <a:solidFill>
                                   <a:schemeClr val="tx1"/>
                                 </a:solidFill>
@@ -3574,13 +3561,13 @@
                     <a:latin typeface="Helvetica" panose="020B0604020202020204" pitchFamily="34" charset="0"/>
                     <a:cs typeface="Helvetica" panose="020B0604020202020204" pitchFamily="34" charset="0"/>
                   </a:rPr>
-                  <a:t>: how do people move within the districts at different time of the day?</a:t>
+                  <a:t>: how do people move within the districts at different times of the day?</a:t>
                 </a:r>
               </a:p>
             </p:txBody>
           </p:sp>
         </mc:Choice>
-        <mc:Fallback xmlns="">
+        <mc:Fallback>
           <p:sp>
             <p:nvSpPr>
               <p:cNvPr id="9" name="Rectangle 8">
@@ -3679,7 +3666,7 @@
           <a:lstStyle/>
           <a:p>
             <a:r>
-              <a:rPr lang="en-US" sz="5000" b="0" dirty="0" err="1">
+              <a:rPr lang="en-US" sz="5000" b="0">
                 <a:solidFill>
                   <a:schemeClr val="tx1"/>
                 </a:solidFill>
@@ -3687,23 +3674,12 @@
                 <a:latin typeface="Helvetica" panose="020B0604020202020204" pitchFamily="34" charset="0"/>
                 <a:cs typeface="Helvetica" panose="020B0604020202020204" pitchFamily="34" charset="0"/>
               </a:rPr>
-              <a:t>Spatio</a:t>
-            </a:r>
-            <a:r>
-              <a:rPr lang="en-US" sz="5000" b="0" dirty="0">
-                <a:solidFill>
-                  <a:schemeClr val="tx1"/>
-                </a:solidFill>
-                <a:effectLst/>
-                <a:latin typeface="Helvetica" panose="020B0604020202020204" pitchFamily="34" charset="0"/>
-                <a:cs typeface="Helvetica" panose="020B0604020202020204" pitchFamily="34" charset="0"/>
-              </a:rPr>
-              <a:t>-temporal mobility patterns are at the core of urban planning applications</a:t>
-            </a:r>
-          </a:p>
-          <a:p>
-            <a:r>
-              <a:rPr lang="en-US" sz="5000" b="0" dirty="0">
+              <a:t>Spatio-temporal mobility patterns are at the core of urban planning applications</a:t>
+            </a:r>
+          </a:p>
+          <a:p>
+            <a:r>
+              <a:rPr lang="en-US" sz="5000" b="0">
                 <a:solidFill>
                   <a:schemeClr val="tx1"/>
                 </a:solidFill>
@@ -3720,7 +3696,7 @@
               <a:buChar char="§"/>
             </a:pPr>
             <a:r>
-              <a:rPr lang="en-US" sz="5000" b="0" dirty="0">
+              <a:rPr lang="en-US" sz="5000" b="0">
                 <a:solidFill>
                   <a:schemeClr val="tx1"/>
                 </a:solidFill>
@@ -3731,7 +3707,7 @@
               <a:t>Mobility patterns can be defined depending on spatiotemporal constraints</a:t>
             </a:r>
             <a:br>
-              <a:rPr lang="en-US" sz="5000" b="0" dirty="0">
+              <a:rPr lang="en-US" sz="5000" b="0">
                 <a:solidFill>
                   <a:schemeClr val="tx1"/>
                 </a:solidFill>
@@ -3741,7 +3717,7 @@
               </a:rPr>
             </a:br>
             <a:r>
-              <a:rPr lang="en-US" sz="5000" b="0" dirty="0">
+              <a:rPr lang="en-US" sz="5000" b="0">
                 <a:solidFill>
                   <a:schemeClr val="tx1"/>
                 </a:solidFill>
@@ -3758,7 +3734,7 @@
               <a:buChar char="§"/>
             </a:pPr>
             <a:r>
-              <a:rPr lang="en-US" sz="5000" b="0" dirty="0">
+              <a:rPr lang="en-US" sz="5000" b="0">
                 <a:solidFill>
                   <a:schemeClr val="tx1"/>
                 </a:solidFill>
@@ -3769,7 +3745,7 @@
               <a:t>Existing approaches extract </a:t>
             </a:r>
             <a:r>
-              <a:rPr lang="en-US" sz="5000" b="1" dirty="0">
+              <a:rPr lang="en-US" sz="5000" b="1">
                 <a:solidFill>
                   <a:schemeClr val="tx1"/>
                 </a:solidFill>
@@ -3780,7 +3756,7 @@
               <a:t>small</a:t>
             </a:r>
             <a:r>
-              <a:rPr lang="en-US" sz="5000" b="0" dirty="0">
+              <a:rPr lang="en-US" sz="5000" b="0">
                 <a:solidFill>
                   <a:schemeClr val="tx1"/>
                 </a:solidFill>
@@ -3791,7 +3767,7 @@
               <a:t> groups of objects sharing </a:t>
             </a:r>
             <a:r>
-              <a:rPr lang="en-US" sz="5000" b="1" dirty="0">
+              <a:rPr lang="en-US" sz="5000" b="1">
                 <a:solidFill>
                   <a:schemeClr val="tx1"/>
                 </a:solidFill>
@@ -3802,7 +3778,7 @@
               <a:t>fine-grained</a:t>
             </a:r>
             <a:r>
-              <a:rPr lang="en-US" sz="5000" b="0" dirty="0">
+              <a:rPr lang="en-US" sz="5000" b="0">
                 <a:solidFill>
                   <a:schemeClr val="tx1"/>
                 </a:solidFill>
@@ -3819,7 +3795,7 @@
               <a:buChar char="§"/>
             </a:pPr>
             <a:r>
-              <a:rPr lang="en-US" sz="5000" b="0" dirty="0">
+              <a:rPr lang="en-US" sz="5000" b="0">
                 <a:solidFill>
                   <a:schemeClr val="tx1"/>
                 </a:solidFill>
@@ -3836,7 +3812,7 @@
               <a:buChar char="§"/>
             </a:pPr>
             <a:r>
-              <a:rPr lang="en-US" sz="5000" b="0" dirty="0">
+              <a:rPr lang="en-US" sz="5000" b="0">
                 <a:solidFill>
                   <a:schemeClr val="tx1"/>
                 </a:solidFill>
@@ -3905,7 +3881,7 @@
               </a:spcAft>
             </a:pPr>
             <a:r>
-              <a:rPr lang="en-US" sz="3200" b="1" dirty="0">
+              <a:rPr lang="en-US" sz="3200" b="1">
                 <a:solidFill>
                   <a:schemeClr val="tx1"/>
                 </a:solidFill>
@@ -3929,7 +3905,7 @@
               <a:buChar char="§"/>
             </a:pPr>
             <a:r>
-              <a:rPr lang="en-US" sz="3200" dirty="0">
+              <a:rPr lang="en-US" sz="3200">
                 <a:solidFill>
                   <a:schemeClr val="tx1"/>
                 </a:solidFill>
@@ -3939,7 +3915,7 @@
               <a:t>Francia Matteo et al. “Colossal Trajectory Mining: A unifying approach to mine behavioral mobility patterns.” </a:t>
             </a:r>
             <a:r>
-              <a:rPr lang="en-US" sz="3200" b="1" dirty="0">
+              <a:rPr lang="en-US" sz="3200" b="1">
                 <a:solidFill>
                   <a:schemeClr val="tx1"/>
                 </a:solidFill>
@@ -3949,7 +3925,7 @@
               <a:t>Expert Systems with Applications</a:t>
             </a:r>
             <a:r>
-              <a:rPr lang="en-US" sz="3200" dirty="0">
+              <a:rPr lang="en-US" sz="3200">
                 <a:solidFill>
                   <a:schemeClr val="tx1"/>
                 </a:solidFill>
@@ -3958,7 +3934,7 @@
               </a:rPr>
               <a:t> 238 (2024): 122055.</a:t>
             </a:r>
-            <a:endParaRPr lang="en-US" sz="3200" dirty="0">
+            <a:endParaRPr lang="en-US" sz="3200">
               <a:solidFill>
                 <a:schemeClr val="tx1"/>
               </a:solidFill>
@@ -4029,7 +4005,7 @@
                 <a:latin typeface="Helvetica" panose="020B0604020202020204" pitchFamily="34" charset="0"/>
                 <a:cs typeface="Helvetica" panose="020B0604020202020204" pitchFamily="34" charset="0"/>
               </a:rPr>
-              <a:t> Rather than enumerating groups of MOs and computing the similarity of their trajectories...</a:t>
+              <a:t>Rather than enumerating groups of MOs and computing the similarity of their trajectories...</a:t>
             </a:r>
           </a:p>
           <a:p>
@@ -4117,7 +4093,7 @@
                 <a:latin typeface="Helvetica" panose="020B0604020202020204" pitchFamily="34" charset="0"/>
                 <a:cs typeface="Helvetica" panose="020B0604020202020204" pitchFamily="34" charset="0"/>
               </a:rPr>
-              <a:t> (e.g., means of transport, activity, time of the day)</a:t>
+              <a:t> (e.g., means of transport, activity, times of the day)</a:t>
             </a:r>
           </a:p>
           <a:p>
@@ -4387,10 +4363,10 @@
           </p:nvGrpSpPr>
           <p:grpSpPr>
             <a:xfrm>
-              <a:off x="18603371" y="19376850"/>
-              <a:ext cx="4730123" cy="4792187"/>
-              <a:chOff x="18438777" y="19376617"/>
-              <a:chExt cx="4730123" cy="4792187"/>
+              <a:off x="18514471" y="19376850"/>
+              <a:ext cx="4819023" cy="4792187"/>
+              <a:chOff x="18349877" y="19376617"/>
+              <a:chExt cx="4819023" cy="4792187"/>
             </a:xfrm>
           </p:grpSpPr>
           <p:pic>
@@ -4504,7 +4480,7 @@
             </p:nvSpPr>
             <p:spPr>
               <a:xfrm>
-                <a:off x="18450357" y="23128170"/>
+                <a:off x="18361457" y="23267870"/>
                 <a:ext cx="1851789" cy="646331"/>
               </a:xfrm>
               <a:prstGeom prst="rect">
@@ -4519,7 +4495,7 @@
               <a:lstStyle/>
               <a:p>
                 <a:r>
-                  <a:rPr lang="it-IT" sz="3600" dirty="0">
+                  <a:rPr lang="en-US" sz="3600">
                     <a:latin typeface="Helvetica" panose="020B0604020202020204" pitchFamily="34" charset="0"/>
                     <a:cs typeface="Helvetica" panose="020B0604020202020204" pitchFamily="34" charset="0"/>
                   </a:rPr>
@@ -4542,7 +4518,7 @@
             </p:nvSpPr>
             <p:spPr>
               <a:xfrm>
-                <a:off x="18438777" y="21286265"/>
+                <a:off x="18349877" y="21425965"/>
                 <a:ext cx="2185214" cy="646331"/>
               </a:xfrm>
               <a:prstGeom prst="rect">
@@ -4557,16 +4533,12 @@
               <a:lstStyle/>
               <a:p>
                 <a:r>
-                  <a:rPr lang="it-IT" sz="3600" dirty="0" err="1">
+                  <a:rPr lang="en-US" sz="3600">
                     <a:latin typeface="Helvetica" panose="020B0604020202020204" pitchFamily="34" charset="0"/>
                     <a:cs typeface="Helvetica" panose="020B0604020202020204" pitchFamily="34" charset="0"/>
                   </a:rPr>
                   <a:t>Afternoon</a:t>
                 </a:r>
-                <a:endParaRPr lang="it-IT" sz="3600" dirty="0">
-                  <a:latin typeface="Helvetica" panose="020B0604020202020204" pitchFamily="34" charset="0"/>
-                  <a:cs typeface="Helvetica" panose="020B0604020202020204" pitchFamily="34" charset="0"/>
-                </a:endParaRPr>
               </a:p>
             </p:txBody>
           </p:sp>
@@ -4599,7 +4571,7 @@
               <a:lstStyle/>
               <a:p>
                 <a:r>
-                  <a:rPr lang="it-IT" sz="2000" i="1" dirty="0">
+                  <a:rPr lang="en-US" sz="2000" i="1">
                     <a:solidFill>
                       <a:schemeClr val="accent1">
                         <a:lumMod val="75000"/>
@@ -4610,7 +4582,7 @@
                   </a:rPr>
                   <a:t>A</a:t>
                 </a:r>
-                <a:endParaRPr lang="en-US" sz="2000" i="1" baseline="-25000" dirty="0">
+                <a:endParaRPr lang="en-US" sz="2000" i="1" baseline="-25000">
                   <a:solidFill>
                     <a:schemeClr val="accent1">
                       <a:lumMod val="75000"/>
@@ -4651,7 +4623,7 @@
               <a:lstStyle/>
               <a:p>
                 <a:r>
-                  <a:rPr lang="it-IT" sz="2000" i="1" dirty="0">
+                  <a:rPr lang="en-US" sz="2000" i="1">
                     <a:solidFill>
                       <a:schemeClr val="accent1">
                         <a:lumMod val="75000"/>
@@ -4662,7 +4634,7 @@
                   </a:rPr>
                   <a:t>B</a:t>
                 </a:r>
-                <a:endParaRPr lang="en-US" sz="2000" i="1" baseline="-25000" dirty="0">
+                <a:endParaRPr lang="en-US" sz="2000" i="1" baseline="-25000">
                   <a:solidFill>
                     <a:schemeClr val="accent1">
                       <a:lumMod val="75000"/>
@@ -4703,7 +4675,7 @@
               <a:lstStyle/>
               <a:p>
                 <a:r>
-                  <a:rPr lang="it-IT" sz="2000" i="1" dirty="0">
+                  <a:rPr lang="en-US" sz="2000" i="1">
                     <a:solidFill>
                       <a:schemeClr val="accent1">
                         <a:lumMod val="75000"/>
@@ -4714,7 +4686,7 @@
                   </a:rPr>
                   <a:t>C</a:t>
                 </a:r>
-                <a:endParaRPr lang="en-US" sz="2000" i="1" baseline="-25000" dirty="0">
+                <a:endParaRPr lang="en-US" sz="2000" i="1" baseline="-25000">
                   <a:solidFill>
                     <a:schemeClr val="accent1">
                       <a:lumMod val="75000"/>
@@ -4755,7 +4727,7 @@
               <a:lstStyle/>
               <a:p>
                 <a:r>
-                  <a:rPr lang="it-IT" sz="2000" i="1" dirty="0">
+                  <a:rPr lang="en-US" sz="2000" i="1">
                     <a:solidFill>
                       <a:schemeClr val="accent1">
                         <a:lumMod val="75000"/>
@@ -4766,7 +4738,7 @@
                   </a:rPr>
                   <a:t>F</a:t>
                 </a:r>
-                <a:endParaRPr lang="en-US" sz="2000" i="1" baseline="-25000" dirty="0">
+                <a:endParaRPr lang="en-US" sz="2000" i="1" baseline="-25000">
                   <a:solidFill>
                     <a:schemeClr val="accent1">
                       <a:lumMod val="75000"/>
@@ -4807,7 +4779,7 @@
               <a:lstStyle/>
               <a:p>
                 <a:r>
-                  <a:rPr lang="it-IT" sz="2000" i="1" dirty="0">
+                  <a:rPr lang="en-US" sz="2000" i="1">
                     <a:solidFill>
                       <a:schemeClr val="accent1">
                         <a:lumMod val="75000"/>
@@ -4818,7 +4790,7 @@
                   </a:rPr>
                   <a:t>E</a:t>
                 </a:r>
-                <a:endParaRPr lang="en-US" sz="2000" i="1" baseline="-25000" dirty="0">
+                <a:endParaRPr lang="en-US" sz="2000" i="1" baseline="-25000">
                   <a:solidFill>
                     <a:schemeClr val="accent1">
                       <a:lumMod val="75000"/>
@@ -4859,7 +4831,7 @@
               <a:lstStyle/>
               <a:p>
                 <a:r>
-                  <a:rPr lang="it-IT" sz="2000" i="1" dirty="0">
+                  <a:rPr lang="en-US" sz="2000" i="1">
                     <a:solidFill>
                       <a:schemeClr val="accent1">
                         <a:lumMod val="75000"/>
@@ -4870,7 +4842,7 @@
                   </a:rPr>
                   <a:t>D</a:t>
                 </a:r>
-                <a:endParaRPr lang="en-US" sz="2000" i="1" baseline="-25000" dirty="0">
+                <a:endParaRPr lang="en-US" sz="2000" i="1" baseline="-25000">
                   <a:solidFill>
                     <a:schemeClr val="accent1">
                       <a:lumMod val="75000"/>
@@ -4911,7 +4883,7 @@
               <a:lstStyle/>
               <a:p>
                 <a:r>
-                  <a:rPr lang="it-IT" sz="2000" i="1" dirty="0">
+                  <a:rPr lang="en-US" sz="2000" i="1">
                     <a:solidFill>
                       <a:schemeClr val="accent1">
                         <a:lumMod val="75000"/>
@@ -4922,7 +4894,7 @@
                   </a:rPr>
                   <a:t>G</a:t>
                 </a:r>
-                <a:endParaRPr lang="en-US" sz="2000" i="1" baseline="-25000" dirty="0">
+                <a:endParaRPr lang="en-US" sz="2000" i="1" baseline="-25000">
                   <a:solidFill>
                     <a:schemeClr val="accent1">
                       <a:lumMod val="75000"/>
@@ -5046,7 +5018,7 @@
           </p:nvSpPr>
           <p:spPr>
             <a:xfrm>
-              <a:off x="18627632" y="16803373"/>
+              <a:off x="18538732" y="16943073"/>
               <a:ext cx="1851789" cy="646331"/>
             </a:xfrm>
             <a:prstGeom prst="rect">
@@ -5061,7 +5033,7 @@
             <a:lstStyle/>
             <a:p>
               <a:r>
-                <a:rPr lang="it-IT" sz="3600" dirty="0">
+                <a:rPr lang="en-US" sz="3600">
                   <a:latin typeface="Helvetica" panose="020B0604020202020204" pitchFamily="34" charset="0"/>
                   <a:cs typeface="Helvetica" panose="020B0604020202020204" pitchFamily="34" charset="0"/>
                 </a:rPr>
@@ -5084,7 +5056,7 @@
           </p:nvSpPr>
           <p:spPr>
             <a:xfrm>
-              <a:off x="18616052" y="14961468"/>
+              <a:off x="18527152" y="15101168"/>
               <a:ext cx="2185214" cy="646331"/>
             </a:xfrm>
             <a:prstGeom prst="rect">
@@ -5099,16 +5071,12 @@
             <a:lstStyle/>
             <a:p>
               <a:r>
-                <a:rPr lang="it-IT" sz="3600" dirty="0" err="1">
+                <a:rPr lang="en-US" sz="3600">
                   <a:latin typeface="Helvetica" panose="020B0604020202020204" pitchFamily="34" charset="0"/>
                   <a:cs typeface="Helvetica" panose="020B0604020202020204" pitchFamily="34" charset="0"/>
                 </a:rPr>
                 <a:t>Afternoon</a:t>
               </a:r>
-              <a:endParaRPr lang="it-IT" sz="3600" dirty="0">
-                <a:latin typeface="Helvetica" panose="020B0604020202020204" pitchFamily="34" charset="0"/>
-                <a:cs typeface="Helvetica" panose="020B0604020202020204" pitchFamily="34" charset="0"/>
-              </a:endParaRPr>
             </a:p>
           </p:txBody>
         </p:sp>
@@ -5161,7 +5129,7 @@
             <a:p>
               <a:pPr algn="ctr"/>
               <a:r>
-                <a:rPr lang="en-US" sz="5500" dirty="0">
+                <a:rPr lang="en-US" sz="5500">
                   <a:solidFill>
                     <a:schemeClr val="bg1"/>
                   </a:solidFill>
@@ -5171,7 +5139,7 @@
                 <a:t>Abstracting</a:t>
               </a:r>
               <a:br>
-                <a:rPr lang="en-US" sz="5500" dirty="0">
+                <a:rPr lang="en-US" sz="5500">
                   <a:solidFill>
                     <a:schemeClr val="bg1"/>
                   </a:solidFill>
@@ -5180,7 +5148,7 @@
                 </a:rPr>
               </a:br>
               <a:r>
-                <a:rPr lang="en-US" sz="5500" dirty="0">
+                <a:rPr lang="en-US" sz="5500">
                   <a:solidFill>
                     <a:schemeClr val="bg1"/>
                   </a:solidFill>
@@ -5241,7 +5209,7 @@
             <a:p>
               <a:pPr algn="ctr"/>
               <a:r>
-                <a:rPr lang="en-US" sz="5500" dirty="0">
+                <a:rPr lang="en-US" sz="5500">
                   <a:solidFill>
                     <a:schemeClr val="bg1"/>
                   </a:solidFill>
@@ -5302,7 +5270,7 @@
             <a:p>
               <a:pPr algn="ctr"/>
               <a:r>
-                <a:rPr lang="en-US" sz="5500" dirty="0">
+                <a:rPr lang="en-US" sz="5500">
                   <a:solidFill>
                     <a:schemeClr val="bg1"/>
                   </a:solidFill>
@@ -5344,7 +5312,7 @@
             <a:p>
               <a:pPr algn="ctr"/>
               <a:r>
-                <a:rPr lang="en-US" sz="5500" dirty="0">
+                <a:rPr lang="en-US" sz="5500">
                   <a:latin typeface="Helvetica" panose="020B0604020202020204" pitchFamily="34" charset="0"/>
                   <a:cs typeface="Helvetica" panose="020B0604020202020204" pitchFamily="34" charset="0"/>
                 </a:rPr>
@@ -5382,7 +5350,7 @@
             <a:lstStyle/>
             <a:p>
               <a:r>
-                <a:rPr lang="en-US" sz="5500" dirty="0">
+                <a:rPr lang="en-US" sz="5500">
                   <a:latin typeface="Helvetica" panose="020B0604020202020204" pitchFamily="34" charset="0"/>
                   <a:cs typeface="Helvetica" panose="020B0604020202020204" pitchFamily="34" charset="0"/>
                 </a:rPr>
@@ -5420,7 +5388,7 @@
             <a:lstStyle/>
             <a:p>
               <a:r>
-                <a:rPr lang="it-IT" sz="2000" i="1" dirty="0">
+                <a:rPr lang="en-US" sz="2000" i="1">
                   <a:solidFill>
                     <a:schemeClr val="accent1">
                       <a:lumMod val="75000"/>
@@ -5431,7 +5399,7 @@
                 </a:rPr>
                 <a:t>A</a:t>
               </a:r>
-              <a:endParaRPr lang="en-US" sz="2000" i="1" baseline="-25000" dirty="0">
+              <a:endParaRPr lang="en-US" sz="2000" i="1" baseline="-25000">
                 <a:solidFill>
                   <a:schemeClr val="accent1">
                     <a:lumMod val="75000"/>
@@ -5472,7 +5440,7 @@
             <a:lstStyle/>
             <a:p>
               <a:r>
-                <a:rPr lang="it-IT" sz="2000" i="1" dirty="0">
+                <a:rPr lang="en-US" sz="2000" i="1">
                   <a:solidFill>
                     <a:schemeClr val="accent1">
                       <a:lumMod val="75000"/>
@@ -5483,7 +5451,7 @@
                 </a:rPr>
                 <a:t>B</a:t>
               </a:r>
-              <a:endParaRPr lang="en-US" sz="2000" i="1" baseline="-25000" dirty="0">
+              <a:endParaRPr lang="en-US" sz="2000" i="1" baseline="-25000">
                 <a:solidFill>
                   <a:schemeClr val="accent1">
                     <a:lumMod val="75000"/>
@@ -5524,7 +5492,7 @@
             <a:lstStyle/>
             <a:p>
               <a:r>
-                <a:rPr lang="it-IT" sz="2000" i="1" dirty="0">
+                <a:rPr lang="en-US" sz="2000" i="1">
                   <a:solidFill>
                     <a:schemeClr val="accent1">
                       <a:lumMod val="75000"/>
@@ -5535,7 +5503,7 @@
                 </a:rPr>
                 <a:t>C</a:t>
               </a:r>
-              <a:endParaRPr lang="en-US" sz="2000" i="1" baseline="-25000" dirty="0">
+              <a:endParaRPr lang="en-US" sz="2000" i="1" baseline="-25000">
                 <a:solidFill>
                   <a:schemeClr val="accent1">
                     <a:lumMod val="75000"/>
@@ -5577,7 +5545,7 @@
             <a:p>
               <a:pPr algn="ctr"/>
               <a:r>
-                <a:rPr lang="en-US" sz="5500" dirty="0">
+                <a:rPr lang="en-US" sz="5500">
                   <a:latin typeface="Helvetica" panose="020B0604020202020204" pitchFamily="34" charset="0"/>
                   <a:cs typeface="Helvetica" panose="020B0604020202020204" pitchFamily="34" charset="0"/>
                 </a:rPr>
@@ -5615,49 +5583,49 @@
             <a:lstStyle/>
             <a:p>
               <a:r>
-                <a:rPr lang="en-US" sz="5500" dirty="0">
+                <a:rPr lang="en-US" sz="5500">
                   <a:latin typeface="Times New Roman" panose="02020603050405020304" pitchFamily="18" charset="0"/>
                   <a:cs typeface="Times New Roman" panose="02020603050405020304" pitchFamily="18" charset="0"/>
                 </a:rPr>
                 <a:t>I</a:t>
               </a:r>
               <a:r>
-                <a:rPr lang="en-US" sz="5500" baseline="-25000" dirty="0">
+                <a:rPr lang="en-US" sz="5500" baseline="-25000">
                   <a:latin typeface="Times New Roman" panose="02020603050405020304" pitchFamily="18" charset="0"/>
                   <a:cs typeface="Times New Roman" panose="02020603050405020304" pitchFamily="18" charset="0"/>
                 </a:rPr>
                 <a:t>A</a:t>
               </a:r>
               <a:r>
-                <a:rPr lang="en-US" sz="5500" dirty="0">
+                <a:rPr lang="en-US" sz="5500">
                   <a:latin typeface="Times New Roman" panose="02020603050405020304" pitchFamily="18" charset="0"/>
                   <a:cs typeface="Times New Roman" panose="02020603050405020304" pitchFamily="18" charset="0"/>
                 </a:rPr>
                 <a:t> = {T</a:t>
               </a:r>
               <a:r>
-                <a:rPr lang="en-US" sz="5500" baseline="-25000" dirty="0">
+                <a:rPr lang="en-US" sz="5500" baseline="-25000">
                   <a:latin typeface="Times New Roman" panose="02020603050405020304" pitchFamily="18" charset="0"/>
                   <a:cs typeface="Times New Roman" panose="02020603050405020304" pitchFamily="18" charset="0"/>
                 </a:rPr>
                 <a:t>R</a:t>
               </a:r>
               <a:r>
-                <a:rPr lang="en-US" sz="5500" dirty="0">
+                <a:rPr lang="en-US" sz="5500">
                   <a:latin typeface="Times New Roman" panose="02020603050405020304" pitchFamily="18" charset="0"/>
                   <a:cs typeface="Times New Roman" panose="02020603050405020304" pitchFamily="18" charset="0"/>
                 </a:rPr>
                 <a:t>, T</a:t>
               </a:r>
               <a:r>
-                <a:rPr lang="en-US" sz="5500" baseline="-25000" dirty="0">
+                <a:rPr lang="en-US" sz="5500" baseline="-25000">
                   <a:latin typeface="Times New Roman" panose="02020603050405020304" pitchFamily="18" charset="0"/>
                   <a:cs typeface="Times New Roman" panose="02020603050405020304" pitchFamily="18" charset="0"/>
                 </a:rPr>
                 <a:t>B</a:t>
               </a:r>
               <a:r>
-                <a:rPr lang="en-US" sz="5500" dirty="0">
+                <a:rPr lang="en-US" sz="5500">
                   <a:latin typeface="Times New Roman" panose="02020603050405020304" pitchFamily="18" charset="0"/>
                   <a:cs typeface="Times New Roman" panose="02020603050405020304" pitchFamily="18" charset="0"/>
                 </a:rPr>
@@ -5666,49 +5634,49 @@
             </a:p>
             <a:p>
               <a:r>
-                <a:rPr lang="en-US" sz="5500" dirty="0">
+                <a:rPr lang="en-US" sz="5500">
                   <a:latin typeface="Times New Roman" panose="02020603050405020304" pitchFamily="18" charset="0"/>
                   <a:cs typeface="Times New Roman" panose="02020603050405020304" pitchFamily="18" charset="0"/>
                 </a:rPr>
                 <a:t>I</a:t>
               </a:r>
               <a:r>
-                <a:rPr lang="en-US" sz="5500" baseline="-25000" dirty="0">
+                <a:rPr lang="en-US" sz="5500" baseline="-25000">
                   <a:latin typeface="Times New Roman" panose="02020603050405020304" pitchFamily="18" charset="0"/>
                   <a:cs typeface="Times New Roman" panose="02020603050405020304" pitchFamily="18" charset="0"/>
                 </a:rPr>
                 <a:t>B</a:t>
               </a:r>
               <a:r>
-                <a:rPr lang="en-US" sz="5500" dirty="0">
+                <a:rPr lang="en-US" sz="5500">
                   <a:latin typeface="Times New Roman" panose="02020603050405020304" pitchFamily="18" charset="0"/>
                   <a:cs typeface="Times New Roman" panose="02020603050405020304" pitchFamily="18" charset="0"/>
                 </a:rPr>
                 <a:t> = {T</a:t>
               </a:r>
               <a:r>
-                <a:rPr lang="en-US" sz="5500" baseline="-25000" dirty="0">
+                <a:rPr lang="en-US" sz="5500" baseline="-25000">
                   <a:latin typeface="Times New Roman" panose="02020603050405020304" pitchFamily="18" charset="0"/>
                   <a:cs typeface="Times New Roman" panose="02020603050405020304" pitchFamily="18" charset="0"/>
                 </a:rPr>
                 <a:t>R</a:t>
               </a:r>
               <a:r>
-                <a:rPr lang="en-US" sz="5500" dirty="0">
+                <a:rPr lang="en-US" sz="5500">
                   <a:latin typeface="Times New Roman" panose="02020603050405020304" pitchFamily="18" charset="0"/>
                   <a:cs typeface="Times New Roman" panose="02020603050405020304" pitchFamily="18" charset="0"/>
                 </a:rPr>
                 <a:t>, T</a:t>
               </a:r>
               <a:r>
-                <a:rPr lang="en-US" sz="5500" baseline="-25000" dirty="0">
+                <a:rPr lang="en-US" sz="5500" baseline="-25000">
                   <a:latin typeface="Times New Roman" panose="02020603050405020304" pitchFamily="18" charset="0"/>
                   <a:cs typeface="Times New Roman" panose="02020603050405020304" pitchFamily="18" charset="0"/>
                 </a:rPr>
                 <a:t>B</a:t>
               </a:r>
               <a:r>
-                <a:rPr lang="en-US" sz="5500" dirty="0">
+                <a:rPr lang="en-US" sz="5500">
                   <a:latin typeface="Times New Roman" panose="02020603050405020304" pitchFamily="18" charset="0"/>
                   <a:cs typeface="Times New Roman" panose="02020603050405020304" pitchFamily="18" charset="0"/>
                 </a:rPr>
@@ -5717,7 +5685,7 @@
             </a:p>
             <a:p>
               <a:r>
-                <a:rPr lang="en-US" sz="5500" dirty="0">
+                <a:rPr lang="en-US" sz="5500">
                   <a:latin typeface="Times New Roman" panose="02020603050405020304" pitchFamily="18" charset="0"/>
                   <a:cs typeface="Times New Roman" panose="02020603050405020304" pitchFamily="18" charset="0"/>
                 </a:rPr>
@@ -5726,35 +5694,35 @@
             </a:p>
             <a:p>
               <a:r>
-                <a:rPr lang="en-US" sz="5500" dirty="0">
+                <a:rPr lang="en-US" sz="5500">
                   <a:latin typeface="Times New Roman" panose="02020603050405020304" pitchFamily="18" charset="0"/>
                   <a:cs typeface="Times New Roman" panose="02020603050405020304" pitchFamily="18" charset="0"/>
                 </a:rPr>
                 <a:t>I</a:t>
               </a:r>
               <a:r>
-                <a:rPr lang="en-US" sz="5500" baseline="-25000" dirty="0">
+                <a:rPr lang="en-US" sz="5500" baseline="-25000">
                   <a:latin typeface="Times New Roman" panose="02020603050405020304" pitchFamily="18" charset="0"/>
                   <a:cs typeface="Times New Roman" panose="02020603050405020304" pitchFamily="18" charset="0"/>
                 </a:rPr>
                 <a:t>X</a:t>
               </a:r>
               <a:r>
-                <a:rPr lang="en-US" sz="5500" dirty="0">
+                <a:rPr lang="en-US" sz="5500">
                   <a:latin typeface="Times New Roman" panose="02020603050405020304" pitchFamily="18" charset="0"/>
                   <a:cs typeface="Times New Roman" panose="02020603050405020304" pitchFamily="18" charset="0"/>
                 </a:rPr>
                 <a:t> = {T</a:t>
               </a:r>
               <a:r>
-                <a:rPr lang="en-US" sz="5500" baseline="-25000" dirty="0">
+                <a:rPr lang="en-US" sz="5500" baseline="-25000">
                   <a:latin typeface="Times New Roman" panose="02020603050405020304" pitchFamily="18" charset="0"/>
                   <a:cs typeface="Times New Roman" panose="02020603050405020304" pitchFamily="18" charset="0"/>
                 </a:rPr>
                 <a:t>R</a:t>
               </a:r>
               <a:r>
-                <a:rPr lang="en-US" sz="5500" dirty="0">
+                <a:rPr lang="en-US" sz="5500">
                   <a:latin typeface="Times New Roman" panose="02020603050405020304" pitchFamily="18" charset="0"/>
                   <a:cs typeface="Times New Roman" panose="02020603050405020304" pitchFamily="18" charset="0"/>
                 </a:rPr>
@@ -6579,7 +6547,7 @@
             <a:p>
               <a:pPr algn="ctr"/>
               <a:r>
-                <a:rPr lang="en-US" sz="5500" dirty="0">
+                <a:rPr lang="en-US" sz="5500">
                   <a:latin typeface="Helvetica" panose="020B0604020202020204" pitchFamily="34" charset="0"/>
                   <a:cs typeface="Helvetica" panose="020B0604020202020204" pitchFamily="34" charset="0"/>
                 </a:rPr>
@@ -7024,7 +6992,7 @@
             <a:lstStyle/>
             <a:p>
               <a:r>
-                <a:rPr lang="en-US" sz="5500" dirty="0">
+                <a:rPr lang="en-US" sz="5500">
                   <a:latin typeface="Helvetica" panose="020B0604020202020204" pitchFamily="34" charset="0"/>
                   <a:cs typeface="Helvetica" panose="020B0604020202020204" pitchFamily="34" charset="0"/>
                 </a:rPr>
@@ -7033,7 +7001,7 @@
             </a:p>
             <a:p>
               <a:r>
-                <a:rPr lang="en-US" sz="5500" dirty="0">
+                <a:rPr lang="en-US" sz="5500">
                   <a:latin typeface="Helvetica" panose="020B0604020202020204" pitchFamily="34" charset="0"/>
                   <a:cs typeface="Helvetica" panose="020B0604020202020204" pitchFamily="34" charset="0"/>
                 </a:rPr>
@@ -7056,7 +7024,7 @@
           </p:nvSpPr>
           <p:spPr>
             <a:xfrm>
-              <a:off x="26365969" y="37129931"/>
+              <a:off x="19985434" y="37244231"/>
               <a:ext cx="1851789" cy="646331"/>
             </a:xfrm>
             <a:prstGeom prst="rect">
@@ -7071,7 +7039,7 @@
             <a:lstStyle/>
             <a:p>
               <a:r>
-                <a:rPr lang="it-IT" sz="3600" dirty="0">
+                <a:rPr lang="en-US" sz="3600">
                   <a:latin typeface="Helvetica" panose="020B0604020202020204" pitchFamily="34" charset="0"/>
                   <a:cs typeface="Helvetica" panose="020B0604020202020204" pitchFamily="34" charset="0"/>
                 </a:rPr>
@@ -7094,7 +7062,7 @@
           </p:nvSpPr>
           <p:spPr>
             <a:xfrm>
-              <a:off x="26390801" y="34737040"/>
+              <a:off x="20010266" y="34890250"/>
               <a:ext cx="2185214" cy="646331"/>
             </a:xfrm>
             <a:prstGeom prst="rect">
@@ -7109,16 +7077,12 @@
             <a:lstStyle/>
             <a:p>
               <a:r>
-                <a:rPr lang="it-IT" sz="3600" dirty="0" err="1">
+                <a:rPr lang="en-US" sz="3600" dirty="0">
                   <a:latin typeface="Helvetica" panose="020B0604020202020204" pitchFamily="34" charset="0"/>
                   <a:cs typeface="Helvetica" panose="020B0604020202020204" pitchFamily="34" charset="0"/>
                 </a:rPr>
                 <a:t>Afternoon</a:t>
               </a:r>
-              <a:endParaRPr lang="it-IT" sz="3600" dirty="0">
-                <a:latin typeface="Helvetica" panose="020B0604020202020204" pitchFamily="34" charset="0"/>
-                <a:cs typeface="Helvetica" panose="020B0604020202020204" pitchFamily="34" charset="0"/>
-              </a:endParaRPr>
             </a:p>
           </p:txBody>
         </p:sp>
@@ -7151,20 +7115,20 @@
             <a:lstStyle/>
             <a:p>
               <a:r>
-                <a:rPr lang="en-US" sz="4000" dirty="0">
+                <a:rPr lang="en-US" sz="4000">
                   <a:latin typeface="Times New Roman" panose="02020603050405020304" pitchFamily="18" charset="0"/>
                   <a:cs typeface="Times New Roman" panose="02020603050405020304" pitchFamily="18" charset="0"/>
                 </a:rPr>
                 <a:t>T</a:t>
               </a:r>
               <a:r>
-                <a:rPr lang="en-US" sz="4000" baseline="-25000" dirty="0">
+                <a:rPr lang="en-US" sz="4000" baseline="-25000">
                   <a:latin typeface="Times New Roman" panose="02020603050405020304" pitchFamily="18" charset="0"/>
                   <a:cs typeface="Times New Roman" panose="02020603050405020304" pitchFamily="18" charset="0"/>
                 </a:rPr>
                 <a:t>B</a:t>
               </a:r>
-              <a:endParaRPr lang="en-US" sz="4000" dirty="0"/>
+              <a:endParaRPr lang="en-US" sz="4000"/>
             </a:p>
           </p:txBody>
         </p:sp>
@@ -7197,20 +7161,20 @@
             <a:lstStyle/>
             <a:p>
               <a:r>
-                <a:rPr lang="en-US" sz="4000" dirty="0">
+                <a:rPr lang="en-US" sz="4000">
                   <a:latin typeface="Times New Roman" panose="02020603050405020304" pitchFamily="18" charset="0"/>
                   <a:cs typeface="Times New Roman" panose="02020603050405020304" pitchFamily="18" charset="0"/>
                 </a:rPr>
                 <a:t>T</a:t>
               </a:r>
               <a:r>
-                <a:rPr lang="en-US" sz="4000" baseline="-25000" dirty="0">
+                <a:rPr lang="en-US" sz="4000" baseline="-25000">
                   <a:latin typeface="Times New Roman" panose="02020603050405020304" pitchFamily="18" charset="0"/>
                   <a:cs typeface="Times New Roman" panose="02020603050405020304" pitchFamily="18" charset="0"/>
                 </a:rPr>
                 <a:t>R </a:t>
               </a:r>
-              <a:endParaRPr lang="en-US" sz="4000" dirty="0"/>
+              <a:endParaRPr lang="en-US" sz="4000"/>
             </a:p>
           </p:txBody>
         </p:sp>
@@ -7243,7 +7207,7 @@
             <a:lstStyle/>
             <a:p>
               <a:r>
-                <a:rPr lang="it-IT" sz="2000" i="1" dirty="0">
+                <a:rPr lang="en-US" sz="2000" i="1">
                   <a:solidFill>
                     <a:schemeClr val="accent1">
                       <a:lumMod val="75000"/>
@@ -7254,7 +7218,7 @@
                 </a:rPr>
                 <a:t>F</a:t>
               </a:r>
-              <a:endParaRPr lang="en-US" sz="2000" i="1" baseline="-25000" dirty="0">
+              <a:endParaRPr lang="en-US" sz="2000" i="1" baseline="-25000">
                 <a:solidFill>
                   <a:schemeClr val="accent1">
                     <a:lumMod val="75000"/>
@@ -7295,7 +7259,7 @@
             <a:lstStyle/>
             <a:p>
               <a:r>
-                <a:rPr lang="it-IT" sz="2000" i="1" dirty="0">
+                <a:rPr lang="en-US" sz="2000" i="1">
                   <a:solidFill>
                     <a:schemeClr val="accent1">
                       <a:lumMod val="75000"/>
@@ -7306,7 +7270,7 @@
                 </a:rPr>
                 <a:t>E</a:t>
               </a:r>
-              <a:endParaRPr lang="en-US" sz="2000" i="1" baseline="-25000" dirty="0">
+              <a:endParaRPr lang="en-US" sz="2000" i="1" baseline="-25000">
                 <a:solidFill>
                   <a:schemeClr val="accent1">
                     <a:lumMod val="75000"/>
@@ -7347,7 +7311,7 @@
             <a:lstStyle/>
             <a:p>
               <a:r>
-                <a:rPr lang="it-IT" sz="2000" i="1" dirty="0">
+                <a:rPr lang="en-US" sz="2000" i="1">
                   <a:solidFill>
                     <a:schemeClr val="accent1">
                       <a:lumMod val="75000"/>
@@ -7358,7 +7322,7 @@
                 </a:rPr>
                 <a:t>D</a:t>
               </a:r>
-              <a:endParaRPr lang="en-US" sz="2000" i="1" baseline="-25000" dirty="0">
+              <a:endParaRPr lang="en-US" sz="2000" i="1" baseline="-25000">
                 <a:solidFill>
                   <a:schemeClr val="accent1">
                     <a:lumMod val="75000"/>
@@ -7399,7 +7363,7 @@
             <a:lstStyle/>
             <a:p>
               <a:r>
-                <a:rPr lang="it-IT" sz="2000" i="1" dirty="0">
+                <a:rPr lang="en-US" sz="2000" i="1">
                   <a:solidFill>
                     <a:schemeClr val="accent1">
                       <a:lumMod val="75000"/>
@@ -7410,7 +7374,7 @@
                 </a:rPr>
                 <a:t>G</a:t>
               </a:r>
-              <a:endParaRPr lang="en-US" sz="2000" i="1" baseline="-25000" dirty="0">
+              <a:endParaRPr lang="en-US" sz="2000" i="1" baseline="-25000">
                 <a:solidFill>
                   <a:schemeClr val="accent1">
                     <a:lumMod val="75000"/>
@@ -8871,7 +8835,7 @@
             <a:lstStyle/>
             <a:p>
               <a:r>
-                <a:rPr lang="it-IT" sz="2000" i="1" dirty="0">
+                <a:rPr lang="en-US" sz="2000" i="1">
                   <a:solidFill>
                     <a:schemeClr val="accent1">
                       <a:lumMod val="75000"/>
@@ -8882,7 +8846,7 @@
                 </a:rPr>
                 <a:t>X</a:t>
               </a:r>
-              <a:endParaRPr lang="en-US" sz="2000" i="1" baseline="-25000" dirty="0">
+              <a:endParaRPr lang="en-US" sz="2000" i="1" baseline="-25000">
                 <a:solidFill>
                   <a:schemeClr val="accent1">
                     <a:lumMod val="75000"/>
@@ -9024,35 +8988,35 @@
             <a:lstStyle/>
             <a:p>
               <a:r>
-                <a:rPr lang="en-US" sz="5500" dirty="0">
+                <a:rPr lang="en-US" sz="5500">
                   <a:latin typeface="Times New Roman" panose="02020603050405020304" pitchFamily="18" charset="0"/>
                   <a:cs typeface="Times New Roman" panose="02020603050405020304" pitchFamily="18" charset="0"/>
                 </a:rPr>
                 <a:t>I = {T</a:t>
               </a:r>
               <a:r>
-                <a:rPr lang="en-US" sz="5500" baseline="-25000" dirty="0">
+                <a:rPr lang="en-US" sz="5500" baseline="-25000">
                   <a:latin typeface="Times New Roman" panose="02020603050405020304" pitchFamily="18" charset="0"/>
                   <a:cs typeface="Times New Roman" panose="02020603050405020304" pitchFamily="18" charset="0"/>
                 </a:rPr>
                 <a:t>R</a:t>
               </a:r>
               <a:r>
-                <a:rPr lang="en-US" sz="5500" dirty="0">
+                <a:rPr lang="en-US" sz="5500">
                   <a:latin typeface="Times New Roman" panose="02020603050405020304" pitchFamily="18" charset="0"/>
                   <a:cs typeface="Times New Roman" panose="02020603050405020304" pitchFamily="18" charset="0"/>
                 </a:rPr>
                 <a:t>, T</a:t>
               </a:r>
               <a:r>
-                <a:rPr lang="en-US" sz="5500" baseline="-25000" dirty="0">
+                <a:rPr lang="en-US" sz="5500" baseline="-25000">
                   <a:latin typeface="Times New Roman" panose="02020603050405020304" pitchFamily="18" charset="0"/>
                   <a:cs typeface="Times New Roman" panose="02020603050405020304" pitchFamily="18" charset="0"/>
                 </a:rPr>
                 <a:t>B</a:t>
               </a:r>
               <a:r>
-                <a:rPr lang="en-US" sz="5500" dirty="0">
+                <a:rPr lang="en-US" sz="5500">
                   <a:latin typeface="Times New Roman" panose="02020603050405020304" pitchFamily="18" charset="0"/>
                   <a:cs typeface="Times New Roman" panose="02020603050405020304" pitchFamily="18" charset="0"/>
                 </a:rPr>
@@ -9061,7 +9025,7 @@
             </a:p>
             <a:p>
               <a:r>
-                <a:rPr lang="en-US" sz="5500" dirty="0">
+                <a:rPr lang="en-US" sz="5500">
                   <a:latin typeface="Times New Roman" panose="02020603050405020304" pitchFamily="18" charset="0"/>
                   <a:cs typeface="Times New Roman" panose="02020603050405020304" pitchFamily="18" charset="0"/>
                 </a:rPr>
@@ -9141,7 +9105,7 @@
             <a:lstStyle/>
             <a:p>
               <a:r>
-                <a:rPr lang="it-IT" sz="2400" i="1" dirty="0">
+                <a:rPr lang="en-US" sz="2400" i="1">
                   <a:solidFill>
                     <a:schemeClr val="accent1">
                       <a:lumMod val="75000"/>
@@ -9152,7 +9116,7 @@
                 </a:rPr>
                 <a:t>A</a:t>
               </a:r>
-              <a:endParaRPr lang="en-US" sz="2400" i="1" baseline="-25000" dirty="0">
+              <a:endParaRPr lang="en-US" sz="2400" i="1" baseline="-25000">
                 <a:solidFill>
                   <a:schemeClr val="accent1">
                     <a:lumMod val="75000"/>
@@ -9193,7 +9157,7 @@
             <a:lstStyle/>
             <a:p>
               <a:r>
-                <a:rPr lang="it-IT" sz="2400" i="1" dirty="0">
+                <a:rPr lang="en-US" sz="2400" i="1">
                   <a:solidFill>
                     <a:schemeClr val="accent1">
                       <a:lumMod val="75000"/>
@@ -9204,7 +9168,7 @@
                 </a:rPr>
                 <a:t>B</a:t>
               </a:r>
-              <a:endParaRPr lang="en-US" sz="2400" i="1" baseline="-25000" dirty="0">
+              <a:endParaRPr lang="en-US" sz="2400" i="1" baseline="-25000">
                 <a:solidFill>
                   <a:schemeClr val="accent1">
                     <a:lumMod val="75000"/>
@@ -9245,7 +9209,7 @@
             <a:lstStyle/>
             <a:p>
               <a:r>
-                <a:rPr lang="it-IT" sz="2400" i="1" dirty="0">
+                <a:rPr lang="en-US" sz="2400" i="1">
                   <a:solidFill>
                     <a:schemeClr val="accent1">
                       <a:lumMod val="75000"/>
@@ -9256,7 +9220,7 @@
                 </a:rPr>
                 <a:t>C</a:t>
               </a:r>
-              <a:endParaRPr lang="en-US" sz="2400" i="1" baseline="-25000" dirty="0">
+              <a:endParaRPr lang="en-US" sz="2400" i="1" baseline="-25000">
                 <a:solidFill>
                   <a:schemeClr val="accent1">
                     <a:lumMod val="75000"/>
@@ -9297,7 +9261,7 @@
             <a:lstStyle/>
             <a:p>
               <a:r>
-                <a:rPr lang="it-IT" sz="2400" i="1" dirty="0">
+                <a:rPr lang="en-US" sz="2400" i="1">
                   <a:solidFill>
                     <a:schemeClr val="accent1">
                       <a:lumMod val="75000"/>
@@ -9308,7 +9272,7 @@
                 </a:rPr>
                 <a:t>F</a:t>
               </a:r>
-              <a:endParaRPr lang="en-US" sz="2400" i="1" baseline="-25000" dirty="0">
+              <a:endParaRPr lang="en-US" sz="2400" i="1" baseline="-25000">
                 <a:solidFill>
                   <a:schemeClr val="accent1">
                     <a:lumMod val="75000"/>
@@ -9349,7 +9313,7 @@
             <a:lstStyle/>
             <a:p>
               <a:r>
-                <a:rPr lang="it-IT" sz="2400" i="1" dirty="0">
+                <a:rPr lang="en-US" sz="2400" i="1">
                   <a:solidFill>
                     <a:schemeClr val="accent1">
                       <a:lumMod val="75000"/>
@@ -9360,7 +9324,7 @@
                 </a:rPr>
                 <a:t>E</a:t>
               </a:r>
-              <a:endParaRPr lang="en-US" sz="2400" i="1" baseline="-25000" dirty="0">
+              <a:endParaRPr lang="en-US" sz="2400" i="1" baseline="-25000">
                 <a:solidFill>
                   <a:schemeClr val="accent1">
                     <a:lumMod val="75000"/>
@@ -9401,7 +9365,7 @@
             <a:lstStyle/>
             <a:p>
               <a:r>
-                <a:rPr lang="it-IT" sz="2400" i="1" dirty="0">
+                <a:rPr lang="en-US" sz="2400" i="1">
                   <a:solidFill>
                     <a:schemeClr val="accent1">
                       <a:lumMod val="75000"/>
@@ -9412,7 +9376,7 @@
                 </a:rPr>
                 <a:t>D</a:t>
               </a:r>
-              <a:endParaRPr lang="en-US" sz="2400" i="1" baseline="-25000" dirty="0">
+              <a:endParaRPr lang="en-US" sz="2400" i="1" baseline="-25000">
                 <a:solidFill>
                   <a:schemeClr val="accent1">
                     <a:lumMod val="75000"/>
@@ -9453,7 +9417,7 @@
             <a:lstStyle/>
             <a:p>
               <a:r>
-                <a:rPr lang="it-IT" sz="2400" i="1" dirty="0">
+                <a:rPr lang="en-US" sz="2400" i="1">
                   <a:solidFill>
                     <a:schemeClr val="accent1">
                       <a:lumMod val="75000"/>
@@ -9464,7 +9428,7 @@
                 </a:rPr>
                 <a:t>G</a:t>
               </a:r>
-              <a:endParaRPr lang="en-US" sz="2400" i="1" baseline="-25000" dirty="0">
+              <a:endParaRPr lang="en-US" sz="2400" i="1" baseline="-25000">
                 <a:solidFill>
                   <a:schemeClr val="accent1">
                     <a:lumMod val="75000"/>

</xml_diff>